<commit_message>
update delete, add email
</commit_message>
<xml_diff>
--- a/Monitoring_EC2_RDS/Monitoring_delete/설계/Monitoring_Deletion_Architecture.pptx
+++ b/Monitoring_EC2_RDS/Monitoring_delete/설계/Monitoring_Deletion_Architecture.pptx
@@ -5,7 +5,7 @@
     <p:sldMasterId id="2147483662" r:id="rId1"/>
   </p:sldMasterIdLst>
   <p:notesMasterIdLst>
-    <p:notesMasterId r:id="rId13"/>
+    <p:notesMasterId r:id="rId12"/>
   </p:notesMasterIdLst>
   <p:sldIdLst>
     <p:sldId id="274" r:id="rId2"/>
@@ -18,7 +18,6 @@
     <p:sldId id="267" r:id="rId9"/>
     <p:sldId id="265" r:id="rId10"/>
     <p:sldId id="269" r:id="rId11"/>
-    <p:sldId id="272" r:id="rId12"/>
   </p:sldIdLst>
   <p:sldSz cx="9144000" cy="5143500" type="screen16x9"/>
   <p:notesSz cx="6858000" cy="9144000"/>
@@ -2395,217 +2394,6 @@
     <p:extLst>
       <p:ext uri="{BB962C8B-B14F-4D97-AF65-F5344CB8AC3E}">
         <p14:creationId xmlns:p14="http://schemas.microsoft.com/office/powerpoint/2010/main" val="2929239104"/>
-      </p:ext>
-    </p:extLst>
-  </p:cSld>
-  <p:clrMapOvr>
-    <a:masterClrMapping/>
-  </p:clrMapOvr>
-</p:notes>
-</file>
-
-<file path=ppt/notesSlides/notesSlide9.xml><?xml version="1.0" encoding="utf-8"?>
-<p:notes xmlns:a="http://schemas.openxmlformats.org/drawingml/2006/main" xmlns:r="http://schemas.openxmlformats.org/officeDocument/2006/relationships" xmlns:p="http://schemas.openxmlformats.org/presentationml/2006/main" showMasterSp="0" showMasterPhAnim="0">
-  <p:cSld>
-    <p:spTree>
-      <p:nvGrpSpPr>
-        <p:cNvPr id="1" name="Shape 155"/>
-        <p:cNvGrpSpPr/>
-        <p:nvPr/>
-      </p:nvGrpSpPr>
-      <p:grpSpPr>
-        <a:xfrm>
-          <a:off x="0" y="0"/>
-          <a:ext cx="0" cy="0"/>
-          <a:chOff x="0" y="0"/>
-          <a:chExt cx="0" cy="0"/>
-        </a:xfrm>
-      </p:grpSpPr>
-      <p:sp>
-        <p:nvSpPr>
-          <p:cNvPr id="156" name="Google Shape;156;g83af416654_0_325:notes"/>
-          <p:cNvSpPr>
-            <a:spLocks noGrp="1" noRot="1" noChangeAspect="1"/>
-          </p:cNvSpPr>
-          <p:nvPr>
-            <p:ph type="sldImg" idx="2"/>
-          </p:nvPr>
-        </p:nvSpPr>
-        <p:spPr>
-          <a:xfrm>
-            <a:off x="685800" y="1143000"/>
-            <a:ext cx="5486400" cy="3086100"/>
-          </a:xfrm>
-          <a:custGeom>
-            <a:avLst/>
-            <a:gdLst/>
-            <a:ahLst/>
-            <a:cxnLst/>
-            <a:rect l="l" t="t" r="r" b="b"/>
-            <a:pathLst>
-              <a:path w="120000" h="120000" extrusionOk="0">
-                <a:moveTo>
-                  <a:pt x="0" y="0"/>
-                </a:moveTo>
-                <a:lnTo>
-                  <a:pt x="120000" y="0"/>
-                </a:lnTo>
-                <a:lnTo>
-                  <a:pt x="120000" y="120000"/>
-                </a:lnTo>
-                <a:lnTo>
-                  <a:pt x="0" y="120000"/>
-                </a:lnTo>
-                <a:close/>
-              </a:path>
-            </a:pathLst>
-          </a:custGeom>
-          <a:noFill/>
-          <a:ln w="12700" cap="flat" cmpd="sng">
-            <a:solidFill>
-              <a:srgbClr val="000000"/>
-            </a:solidFill>
-            <a:prstDash val="solid"/>
-            <a:round/>
-            <a:headEnd type="none" w="sm" len="sm"/>
-            <a:tailEnd type="none" w="sm" len="sm"/>
-          </a:ln>
-        </p:spPr>
-      </p:sp>
-      <p:sp>
-        <p:nvSpPr>
-          <p:cNvPr id="157" name="Google Shape;157;g83af416654_0_325:notes"/>
-          <p:cNvSpPr txBox="1">
-            <a:spLocks noGrp="1"/>
-          </p:cNvSpPr>
-          <p:nvPr>
-            <p:ph type="body" idx="1"/>
-          </p:nvPr>
-        </p:nvSpPr>
-        <p:spPr>
-          <a:xfrm>
-            <a:off x="685800" y="4400556"/>
-            <a:ext cx="5486400" cy="3600300"/>
-          </a:xfrm>
-          <a:prstGeom prst="rect">
-            <a:avLst/>
-          </a:prstGeom>
-          <a:noFill/>
-          <a:ln>
-            <a:noFill/>
-          </a:ln>
-        </p:spPr>
-        <p:txBody>
-          <a:bodyPr spcFirstLastPara="1" wrap="square" lIns="91425" tIns="45700" rIns="91425" bIns="45700" anchor="t" anchorCtr="0">
-            <a:noAutofit/>
-          </a:bodyPr>
-          <a:lstStyle/>
-          <a:p>
-            <a:pPr marL="0" lvl="0" indent="0" algn="l" rtl="0">
-              <a:spcBef>
-                <a:spcPts val="0"/>
-              </a:spcBef>
-              <a:spcAft>
-                <a:spcPts val="0"/>
-              </a:spcAft>
-              <a:buNone/>
-            </a:pPr>
-            <a:endParaRPr/>
-          </a:p>
-        </p:txBody>
-      </p:sp>
-      <p:sp>
-        <p:nvSpPr>
-          <p:cNvPr id="158" name="Google Shape;158;g83af416654_0_325:notes"/>
-          <p:cNvSpPr txBox="1">
-            <a:spLocks noGrp="1"/>
-          </p:cNvSpPr>
-          <p:nvPr>
-            <p:ph type="hdr" idx="3"/>
-          </p:nvPr>
-        </p:nvSpPr>
-        <p:spPr>
-          <a:xfrm>
-            <a:off x="0" y="0"/>
-            <a:ext cx="2971800" cy="458700"/>
-          </a:xfrm>
-          <a:prstGeom prst="rect">
-            <a:avLst/>
-          </a:prstGeom>
-          <a:noFill/>
-          <a:ln>
-            <a:noFill/>
-          </a:ln>
-        </p:spPr>
-        <p:txBody>
-          <a:bodyPr spcFirstLastPara="1" wrap="square" lIns="91425" tIns="45700" rIns="91425" bIns="45700" anchor="t" anchorCtr="0">
-            <a:noAutofit/>
-          </a:bodyPr>
-          <a:lstStyle/>
-          <a:p>
-            <a:pPr marL="0" lvl="0" indent="0" algn="l" rtl="0">
-              <a:spcBef>
-                <a:spcPts val="0"/>
-              </a:spcBef>
-              <a:spcAft>
-                <a:spcPts val="0"/>
-              </a:spcAft>
-              <a:buNone/>
-            </a:pPr>
-            <a:endParaRPr/>
-          </a:p>
-        </p:txBody>
-      </p:sp>
-      <p:sp>
-        <p:nvSpPr>
-          <p:cNvPr id="159" name="Google Shape;159;g83af416654_0_325:notes"/>
-          <p:cNvSpPr txBox="1">
-            <a:spLocks noGrp="1"/>
-          </p:cNvSpPr>
-          <p:nvPr>
-            <p:ph type="sldNum" idx="12"/>
-          </p:nvPr>
-        </p:nvSpPr>
-        <p:spPr>
-          <a:xfrm>
-            <a:off x="3884613" y="8685225"/>
-            <a:ext cx="2971800" cy="458700"/>
-          </a:xfrm>
-          <a:prstGeom prst="rect">
-            <a:avLst/>
-          </a:prstGeom>
-          <a:noFill/>
-          <a:ln>
-            <a:noFill/>
-          </a:ln>
-        </p:spPr>
-        <p:txBody>
-          <a:bodyPr spcFirstLastPara="1" wrap="square" lIns="91425" tIns="45700" rIns="91425" bIns="45700" anchor="b" anchorCtr="0">
-            <a:noAutofit/>
-          </a:bodyPr>
-          <a:lstStyle/>
-          <a:p>
-            <a:pPr marL="0" lvl="0" indent="0" algn="r" rtl="0">
-              <a:spcBef>
-                <a:spcPts val="0"/>
-              </a:spcBef>
-              <a:spcAft>
-                <a:spcPts val="0"/>
-              </a:spcAft>
-              <a:buNone/>
-            </a:pPr>
-            <a:fld id="{00000000-1234-1234-1234-123412341234}" type="slidenum">
-              <a:rPr lang="en-US" altLang="ko"/>
-              <a:t>11</a:t>
-            </a:fld>
-            <a:endParaRPr/>
-          </a:p>
-        </p:txBody>
-      </p:sp>
-    </p:spTree>
-    <p:extLst>
-      <p:ext uri="{BB962C8B-B14F-4D97-AF65-F5344CB8AC3E}">
-        <p14:creationId xmlns:p14="http://schemas.microsoft.com/office/powerpoint/2010/main" val="3741955560"/>
       </p:ext>
     </p:extLst>
   </p:cSld>
@@ -9130,575 +8918,6 @@
     <p:extLst>
       <p:ext uri="{BB962C8B-B14F-4D97-AF65-F5344CB8AC3E}">
         <p14:creationId xmlns:p14="http://schemas.microsoft.com/office/powerpoint/2010/main" val="501204870"/>
-      </p:ext>
-    </p:extLst>
-  </p:cSld>
-  <p:clrMapOvr>
-    <a:masterClrMapping/>
-  </p:clrMapOvr>
-</p:sld>
-</file>
-
-<file path=ppt/slides/slide11.xml><?xml version="1.0" encoding="utf-8"?>
-<p:sld xmlns:a="http://schemas.openxmlformats.org/drawingml/2006/main" xmlns:r="http://schemas.openxmlformats.org/officeDocument/2006/relationships" xmlns:p="http://schemas.openxmlformats.org/presentationml/2006/main">
-  <p:cSld>
-    <p:spTree>
-      <p:nvGrpSpPr>
-        <p:cNvPr id="1" name="Shape 160"/>
-        <p:cNvGrpSpPr/>
-        <p:nvPr/>
-      </p:nvGrpSpPr>
-      <p:grpSpPr>
-        <a:xfrm>
-          <a:off x="0" y="0"/>
-          <a:ext cx="0" cy="0"/>
-          <a:chOff x="0" y="0"/>
-          <a:chExt cx="0" cy="0"/>
-        </a:xfrm>
-      </p:grpSpPr>
-      <p:sp>
-        <p:nvSpPr>
-          <p:cNvPr id="161" name="Google Shape;161;p20"/>
-          <p:cNvSpPr txBox="1">
-            <a:spLocks noGrp="1"/>
-          </p:cNvSpPr>
-          <p:nvPr>
-            <p:ph type="title"/>
-          </p:nvPr>
-        </p:nvSpPr>
-        <p:spPr>
-          <a:xfrm>
-            <a:off x="251222" y="72933"/>
-            <a:ext cx="8641500" cy="390900"/>
-          </a:xfrm>
-          <a:prstGeom prst="rect">
-            <a:avLst/>
-          </a:prstGeom>
-          <a:noFill/>
-          <a:ln>
-            <a:noFill/>
-          </a:ln>
-        </p:spPr>
-        <p:txBody>
-          <a:bodyPr spcFirstLastPara="1" wrap="square" lIns="68575" tIns="34275" rIns="68575" bIns="34275" anchor="ctr" anchorCtr="0">
-            <a:noAutofit/>
-          </a:bodyPr>
-          <a:lstStyle/>
-          <a:p>
-            <a:pPr marL="476250" lvl="0" indent="-342900" algn="l" rtl="0">
-              <a:lnSpc>
-                <a:spcPct val="90000"/>
-              </a:lnSpc>
-              <a:spcBef>
-                <a:spcPts val="0"/>
-              </a:spcBef>
-              <a:spcAft>
-                <a:spcPts val="0"/>
-              </a:spcAft>
-              <a:buSzPts val="1500"/>
-              <a:buFont typeface="+mj-lt"/>
-              <a:buAutoNum type="arabicPeriod" startAt="4"/>
-            </a:pPr>
-            <a:r>
-              <a:rPr lang="ko-KR" altLang="en-US" dirty="0"/>
-              <a:t>세부 사항</a:t>
-            </a:r>
-            <a:endParaRPr dirty="0"/>
-          </a:p>
-        </p:txBody>
-      </p:sp>
-      <p:sp>
-        <p:nvSpPr>
-          <p:cNvPr id="162" name="Google Shape;162;p20"/>
-          <p:cNvSpPr txBox="1">
-            <a:spLocks noGrp="1"/>
-          </p:cNvSpPr>
-          <p:nvPr>
-            <p:ph type="body" idx="1"/>
-          </p:nvPr>
-        </p:nvSpPr>
-        <p:spPr>
-          <a:xfrm>
-            <a:off x="251222" y="689165"/>
-            <a:ext cx="8641500" cy="295500"/>
-          </a:xfrm>
-          <a:prstGeom prst="rect">
-            <a:avLst/>
-          </a:prstGeom>
-          <a:noFill/>
-          <a:ln>
-            <a:noFill/>
-          </a:ln>
-        </p:spPr>
-        <p:txBody>
-          <a:bodyPr spcFirstLastPara="1" wrap="square" lIns="68575" tIns="34275" rIns="68575" bIns="34275" anchor="t" anchorCtr="0">
-            <a:noAutofit/>
-          </a:bodyPr>
-          <a:lstStyle/>
-          <a:p>
-            <a:pPr marL="0" lvl="0" indent="0">
-              <a:spcBef>
-                <a:spcPts val="0"/>
-              </a:spcBef>
-              <a:spcAft>
-                <a:spcPts val="1600"/>
-              </a:spcAft>
-              <a:buClr>
-                <a:srgbClr val="262626"/>
-              </a:buClr>
-            </a:pPr>
-            <a:r>
-              <a:rPr lang="ko-KR" altLang="en-US" dirty="0">
-                <a:solidFill>
-                  <a:schemeClr val="tx1"/>
-                </a:solidFill>
-              </a:rPr>
-              <a:t>예외 대상 목록에 대한 접근 권한 정책</a:t>
-            </a:r>
-            <a:endParaRPr dirty="0">
-              <a:solidFill>
-                <a:schemeClr val="tx1"/>
-              </a:solidFill>
-            </a:endParaRPr>
-          </a:p>
-        </p:txBody>
-      </p:sp>
-      <p:sp>
-        <p:nvSpPr>
-          <p:cNvPr id="163" name="Google Shape;163;p20"/>
-          <p:cNvSpPr/>
-          <p:nvPr/>
-        </p:nvSpPr>
-        <p:spPr>
-          <a:xfrm>
-            <a:off x="251225" y="984675"/>
-            <a:ext cx="8641500" cy="3558900"/>
-          </a:xfrm>
-          <a:prstGeom prst="rect">
-            <a:avLst/>
-          </a:prstGeom>
-          <a:noFill/>
-          <a:ln w="12700" cap="flat" cmpd="sng">
-            <a:solidFill>
-              <a:srgbClr val="232F3D"/>
-            </a:solidFill>
-            <a:prstDash val="solid"/>
-            <a:miter lim="800000"/>
-            <a:headEnd type="none" w="sm" len="sm"/>
-            <a:tailEnd type="none" w="sm" len="sm"/>
-          </a:ln>
-        </p:spPr>
-        <p:txBody>
-          <a:bodyPr spcFirstLastPara="1" wrap="square" lIns="457200" tIns="91425" rIns="91425" bIns="45700" anchor="t" anchorCtr="0">
-            <a:noAutofit/>
-          </a:bodyPr>
-          <a:lstStyle/>
-          <a:p>
-            <a:pPr marL="0" marR="0" lvl="0" indent="0" algn="l" rtl="0">
-              <a:spcBef>
-                <a:spcPts val="0"/>
-              </a:spcBef>
-              <a:spcAft>
-                <a:spcPts val="0"/>
-              </a:spcAft>
-              <a:buNone/>
-            </a:pPr>
-            <a:endParaRPr/>
-          </a:p>
-        </p:txBody>
-      </p:sp>
-      <p:sp>
-        <p:nvSpPr>
-          <p:cNvPr id="10" name="Google Shape;109;p18">
-            <a:extLst>
-              <a:ext uri="{FF2B5EF4-FFF2-40B4-BE49-F238E27FC236}">
-                <a16:creationId xmlns:a16="http://schemas.microsoft.com/office/drawing/2014/main" id="{6E39FDC1-A4C7-4B3A-8957-D12A7A900DC3}"/>
-              </a:ext>
-            </a:extLst>
-          </p:cNvPr>
-          <p:cNvSpPr/>
-          <p:nvPr/>
-        </p:nvSpPr>
-        <p:spPr>
-          <a:xfrm>
-            <a:off x="278049" y="1035425"/>
-            <a:ext cx="8561151" cy="3418910"/>
-          </a:xfrm>
-          <a:prstGeom prst="rect">
-            <a:avLst/>
-          </a:prstGeom>
-          <a:noFill/>
-          <a:ln>
-            <a:noFill/>
-          </a:ln>
-        </p:spPr>
-        <p:txBody>
-          <a:bodyPr spcFirstLastPara="1" wrap="square" lIns="68575" tIns="34275" rIns="68575" bIns="34275" anchor="t" anchorCtr="0">
-            <a:noAutofit/>
-          </a:bodyPr>
-          <a:lstStyle/>
-          <a:p>
-            <a:pPr marL="17100" lvl="0" eaLnBrk="0" fontAlgn="base" hangingPunct="0">
-              <a:lnSpc>
-                <a:spcPct val="150000"/>
-              </a:lnSpc>
-              <a:spcBef>
-                <a:spcPct val="0"/>
-              </a:spcBef>
-              <a:spcAft>
-                <a:spcPct val="0"/>
-              </a:spcAft>
-              <a:buClrTx/>
-            </a:pPr>
-            <a:endParaRPr lang="en-US" altLang="ko-KR" dirty="0">
-              <a:solidFill>
-                <a:schemeClr val="tx1"/>
-              </a:solidFill>
-              <a:latin typeface="Arial" panose="020B0604020202020204" pitchFamily="34" charset="0"/>
-            </a:endParaRPr>
-          </a:p>
-        </p:txBody>
-      </p:sp>
-      <p:sp>
-        <p:nvSpPr>
-          <p:cNvPr id="8" name="Google Shape;109;p18">
-            <a:extLst>
-              <a:ext uri="{FF2B5EF4-FFF2-40B4-BE49-F238E27FC236}">
-                <a16:creationId xmlns:a16="http://schemas.microsoft.com/office/drawing/2014/main" id="{37EAD871-8C09-4675-94E9-A7FBD646BB5E}"/>
-              </a:ext>
-            </a:extLst>
-          </p:cNvPr>
-          <p:cNvSpPr/>
-          <p:nvPr/>
-        </p:nvSpPr>
-        <p:spPr>
-          <a:xfrm>
-            <a:off x="4645956" y="1033775"/>
-            <a:ext cx="4083680" cy="3418910"/>
-          </a:xfrm>
-          <a:prstGeom prst="rect">
-            <a:avLst/>
-          </a:prstGeom>
-          <a:noFill/>
-          <a:ln>
-            <a:solidFill>
-              <a:schemeClr val="tx1"/>
-            </a:solidFill>
-          </a:ln>
-        </p:spPr>
-        <p:txBody>
-          <a:bodyPr spcFirstLastPara="1" wrap="square" lIns="68575" tIns="34275" rIns="68575" bIns="34275" anchor="t" anchorCtr="0">
-            <a:noAutofit/>
-          </a:bodyPr>
-          <a:lstStyle/>
-          <a:p>
-            <a:pPr lvl="0">
-              <a:spcBef>
-                <a:spcPts val="500"/>
-              </a:spcBef>
-            </a:pPr>
-            <a:r>
-              <a:rPr lang="en-US" altLang="ko-KR" sz="1000" dirty="0"/>
-              <a:t>{    "Version": "2012-10-17",</a:t>
-            </a:r>
-            <a:br>
-              <a:rPr lang="en-US" altLang="ko-KR" sz="1000" dirty="0"/>
-            </a:br>
-            <a:r>
-              <a:rPr lang="en-US" altLang="ko-KR" sz="1000" dirty="0"/>
-              <a:t>    "Id": "Policy1591581382564",</a:t>
-            </a:r>
-            <a:br>
-              <a:rPr lang="en-US" altLang="ko-KR" sz="1000" dirty="0"/>
-            </a:br>
-            <a:r>
-              <a:rPr lang="en-US" altLang="ko-KR" sz="1000" dirty="0"/>
-              <a:t>    "Statement": [</a:t>
-            </a:r>
-            <a:br>
-              <a:rPr lang="en-US" altLang="ko-KR" sz="1000" dirty="0"/>
-            </a:br>
-            <a:r>
-              <a:rPr lang="en-US" altLang="ko-KR" sz="1000" dirty="0"/>
-              <a:t>       {</a:t>
-            </a:r>
-            <a:br>
-              <a:rPr lang="en-US" altLang="ko-KR" sz="1000" dirty="0"/>
-            </a:br>
-            <a:r>
-              <a:rPr lang="en-US" altLang="ko-KR" sz="1000" dirty="0"/>
-              <a:t>            "Sid": "Stmt1591592234369",</a:t>
-            </a:r>
-          </a:p>
-          <a:p>
-            <a:pPr lvl="0">
-              <a:spcBef>
-                <a:spcPts val="500"/>
-              </a:spcBef>
-            </a:pPr>
-            <a:r>
-              <a:rPr lang="en-US" altLang="ko-KR" sz="1000" dirty="0"/>
-              <a:t>            "Action": "s3:*",</a:t>
-            </a:r>
-            <a:br>
-              <a:rPr lang="en-US" altLang="ko-KR" sz="1000" dirty="0"/>
-            </a:br>
-            <a:r>
-              <a:rPr lang="en-US" altLang="ko-KR" sz="1000" dirty="0"/>
-              <a:t>            "Effect": "Deny",</a:t>
-            </a:r>
-            <a:br>
-              <a:rPr lang="en-US" altLang="ko-KR" sz="1000" dirty="0"/>
-            </a:br>
-            <a:r>
-              <a:rPr lang="en-US" altLang="ko-KR" sz="1000" dirty="0"/>
-              <a:t>            "Resource": "arn:aws:s3:::[</a:t>
-            </a:r>
-            <a:r>
-              <a:rPr lang="ko-KR" altLang="en-US" sz="1000" dirty="0"/>
-              <a:t>예외 대상 목록</a:t>
-            </a:r>
-            <a:r>
-              <a:rPr lang="en-US" altLang="ko-KR" sz="1000" dirty="0"/>
-              <a:t>]</a:t>
-            </a:r>
-            <a:r>
-              <a:rPr lang="ko-KR" altLang="en-US" sz="1000" dirty="0"/>
-              <a:t>＂</a:t>
-            </a:r>
-            <a:r>
-              <a:rPr lang="en-US" altLang="ko-KR" sz="1000" dirty="0"/>
-              <a:t>,</a:t>
-            </a:r>
-            <a:br>
-              <a:rPr lang="en-US" altLang="ko-KR" sz="1000" dirty="0"/>
-            </a:br>
-            <a:r>
-              <a:rPr lang="en-US" altLang="ko-KR" sz="1000" dirty="0"/>
-              <a:t>            </a:t>
-            </a:r>
-            <a:r>
-              <a:rPr lang="ko-KR" altLang="en-US" sz="1000" dirty="0"/>
-              <a:t>＂</a:t>
-            </a:r>
-            <a:r>
-              <a:rPr lang="en-US" altLang="ko-KR" sz="1000" dirty="0" err="1"/>
-              <a:t>NotPrincipal</a:t>
-            </a:r>
-            <a:r>
-              <a:rPr lang="ko-KR" altLang="en-US" sz="1000" dirty="0"/>
-              <a:t>＂</a:t>
-            </a:r>
-            <a:r>
-              <a:rPr lang="en-US" altLang="ko-KR" sz="1000" dirty="0"/>
-              <a:t>: {</a:t>
-            </a:r>
-            <a:br>
-              <a:rPr lang="en-US" altLang="ko-KR" sz="1000" dirty="0"/>
-            </a:br>
-            <a:r>
-              <a:rPr lang="en-US" altLang="ko-KR" sz="1000" dirty="0"/>
-              <a:t>                </a:t>
-            </a:r>
-            <a:r>
-              <a:rPr lang="ko-KR" altLang="en-US" sz="1000" dirty="0"/>
-              <a:t>＂</a:t>
-            </a:r>
-            <a:r>
-              <a:rPr lang="en-US" altLang="ko-KR" sz="1000" dirty="0"/>
-              <a:t>AWS</a:t>
-            </a:r>
-            <a:r>
-              <a:rPr lang="ko-KR" altLang="en-US" sz="1000" dirty="0"/>
-              <a:t>＂</a:t>
-            </a:r>
-            <a:r>
-              <a:rPr lang="en-US" altLang="ko-KR" sz="1000" dirty="0"/>
-              <a:t>:[</a:t>
-            </a:r>
-            <a:br>
-              <a:rPr lang="en-US" altLang="ko-KR" sz="1000" dirty="0"/>
-            </a:br>
-            <a:r>
-              <a:rPr lang="en-US" altLang="ko-KR" sz="1000" dirty="0"/>
-              <a:t>	“{IAM USER}“</a:t>
-            </a:r>
-            <a:br>
-              <a:rPr lang="en-US" altLang="ko-KR" sz="1000" dirty="0"/>
-            </a:br>
-            <a:r>
-              <a:rPr lang="en-US" altLang="ko-KR" sz="1000" dirty="0"/>
-              <a:t>                ]</a:t>
-            </a:r>
-            <a:br>
-              <a:rPr lang="en-US" altLang="ko-KR" sz="1000" dirty="0"/>
-            </a:br>
-            <a:r>
-              <a:rPr lang="en-US" altLang="ko-KR" sz="1000" dirty="0"/>
-              <a:t>            },</a:t>
-            </a:r>
-            <a:br>
-              <a:rPr lang="en-US" altLang="ko-KR" sz="1000" dirty="0"/>
-            </a:br>
-            <a:r>
-              <a:rPr lang="en-US" altLang="ko-KR" sz="1000" dirty="0"/>
-              <a:t>            </a:t>
-            </a:r>
-            <a:r>
-              <a:rPr lang="ko-KR" altLang="en-US" sz="1000" dirty="0"/>
-              <a:t>＂</a:t>
-            </a:r>
-            <a:r>
-              <a:rPr lang="en-US" altLang="ko-KR" sz="1000" dirty="0"/>
-              <a:t>Condition</a:t>
-            </a:r>
-            <a:r>
-              <a:rPr lang="ko-KR" altLang="en-US" sz="1000" dirty="0"/>
-              <a:t>＂</a:t>
-            </a:r>
-            <a:r>
-              <a:rPr lang="en-US" altLang="ko-KR" sz="1000" dirty="0"/>
-              <a:t>: {</a:t>
-            </a:r>
-            <a:br>
-              <a:rPr lang="en-US" altLang="ko-KR" sz="1000" dirty="0"/>
-            </a:br>
-            <a:r>
-              <a:rPr lang="en-US" altLang="ko-KR" sz="1000" dirty="0"/>
-              <a:t>                </a:t>
-            </a:r>
-            <a:r>
-              <a:rPr lang="ko-KR" altLang="en-US" sz="1000" dirty="0"/>
-              <a:t>＂</a:t>
-            </a:r>
-            <a:r>
-              <a:rPr lang="en-US" altLang="ko-KR" sz="1000" dirty="0" err="1"/>
-              <a:t>StringNotEquals</a:t>
-            </a:r>
-            <a:r>
-              <a:rPr lang="ko-KR" altLang="en-US" sz="1000" dirty="0"/>
-              <a:t>＂</a:t>
-            </a:r>
-            <a:r>
-              <a:rPr lang="en-US" altLang="ko-KR" sz="1000" dirty="0"/>
-              <a:t>: {</a:t>
-            </a:r>
-            <a:br>
-              <a:rPr lang="en-US" altLang="ko-KR" sz="1000" dirty="0"/>
-            </a:br>
-            <a:r>
-              <a:rPr lang="en-US" altLang="ko-KR" sz="1000" dirty="0"/>
-              <a:t>                    </a:t>
-            </a:r>
-            <a:r>
-              <a:rPr lang="ko-KR" altLang="en-US" sz="1000" dirty="0"/>
-              <a:t>＂</a:t>
-            </a:r>
-            <a:r>
-              <a:rPr lang="en-US" altLang="ko-KR" sz="1000" dirty="0" err="1"/>
-              <a:t>aws:PrincipalArn</a:t>
-            </a:r>
-            <a:r>
-              <a:rPr lang="ko-KR" altLang="en-US" sz="1000" dirty="0"/>
-              <a:t>＂</a:t>
-            </a:r>
-            <a:r>
-              <a:rPr lang="en-US" altLang="ko-KR" sz="1000" dirty="0"/>
-              <a:t>: </a:t>
-            </a:r>
-            <a:r>
-              <a:rPr lang="ko-KR" altLang="en-US" sz="1000" dirty="0"/>
-              <a:t>＂</a:t>
-            </a:r>
-            <a:r>
-              <a:rPr lang="en-US" altLang="ko-KR" sz="1000" dirty="0" err="1"/>
-              <a:t>arn:aws:iam</a:t>
-            </a:r>
-            <a:r>
-              <a:rPr lang="en-US" altLang="ko-KR" sz="1000" dirty="0"/>
-              <a:t>::[lambda-role]“</a:t>
-            </a:r>
-            <a:br>
-              <a:rPr lang="en-US" altLang="ko-KR" sz="1000" dirty="0"/>
-            </a:br>
-            <a:r>
-              <a:rPr lang="en-US" altLang="ko-KR" sz="1000" dirty="0"/>
-              <a:t>                }</a:t>
-            </a:r>
-            <a:br>
-              <a:rPr lang="en-US" altLang="ko-KR" sz="1000" dirty="0"/>
-            </a:br>
-            <a:r>
-              <a:rPr lang="en-US" altLang="ko-KR" sz="1000" dirty="0"/>
-              <a:t>            }</a:t>
-            </a:r>
-            <a:br>
-              <a:rPr lang="en-US" altLang="ko-KR" sz="1000" dirty="0"/>
-            </a:br>
-            <a:r>
-              <a:rPr lang="en-US" altLang="ko-KR" sz="1000" dirty="0"/>
-              <a:t>        }</a:t>
-            </a:r>
-          </a:p>
-          <a:p>
-            <a:pPr lvl="0">
-              <a:spcBef>
-                <a:spcPts val="500"/>
-              </a:spcBef>
-            </a:pPr>
-            <a:r>
-              <a:rPr lang="en-US" altLang="ko-KR" sz="1000" dirty="0"/>
-              <a:t>    ]</a:t>
-            </a:r>
-            <a:br>
-              <a:rPr lang="en-US" altLang="ko-KR" sz="1000" dirty="0"/>
-            </a:br>
-            <a:r>
-              <a:rPr lang="en-US" altLang="ko-KR" sz="1000" dirty="0"/>
-              <a:t>}</a:t>
-            </a:r>
-          </a:p>
-        </p:txBody>
-      </p:sp>
-      <p:pic>
-        <p:nvPicPr>
-          <p:cNvPr id="3" name="그림 2">
-            <a:extLst>
-              <a:ext uri="{FF2B5EF4-FFF2-40B4-BE49-F238E27FC236}">
-                <a16:creationId xmlns:a16="http://schemas.microsoft.com/office/drawing/2014/main" id="{40324938-29E5-4363-A5CD-4BB7C13709AF}"/>
-              </a:ext>
-            </a:extLst>
-          </p:cNvPr>
-          <p:cNvPicPr>
-            <a:picLocks noChangeAspect="1"/>
-          </p:cNvPicPr>
-          <p:nvPr/>
-        </p:nvPicPr>
-        <p:blipFill>
-          <a:blip r:embed="rId3"/>
-          <a:stretch>
-            <a:fillRect/>
-          </a:stretch>
-        </p:blipFill>
-        <p:spPr>
-          <a:xfrm>
-            <a:off x="441041" y="1042894"/>
-            <a:ext cx="3943795" cy="3409791"/>
-          </a:xfrm>
-          <a:prstGeom prst="rect">
-            <a:avLst/>
-          </a:prstGeom>
-          <a:ln>
-            <a:solidFill>
-              <a:schemeClr val="tx1"/>
-            </a:solidFill>
-          </a:ln>
-        </p:spPr>
-      </p:pic>
-    </p:spTree>
-    <p:extLst>
-      <p:ext uri="{BB962C8B-B14F-4D97-AF65-F5344CB8AC3E}">
-        <p14:creationId xmlns:p14="http://schemas.microsoft.com/office/powerpoint/2010/main" val="1867959211"/>
       </p:ext>
     </p:extLst>
   </p:cSld>

</xml_diff>